<commit_message>
added diagram of address structure
</commit_message>
<xml_diff>
--- a/voltaire/design-doc/Indirection.pptx
+++ b/voltaire/design-doc/Indirection.pptx
@@ -3831,6 +3831,13 @@
             <a:pPr algn="ctr"/>
             <a:r>
               <a:rPr lang="en-US" dirty="0"/>
+              <a:t>Payment</a:t>
+            </a:r>
+            <a:br>
+              <a:rPr lang="en-US" dirty="0"/>
+            </a:br>
+            <a:r>
+              <a:rPr lang="en-US" dirty="0"/>
               <a:t>Address</a:t>
             </a:r>
           </a:p>
@@ -3838,10 +3845,10 @@
       </p:sp>
       <p:sp>
         <p:nvSpPr>
-          <p:cNvPr id="7" name="Rectangle 6">
-            <a:extLst>
-              <a:ext uri="{FF2B5EF4-FFF2-40B4-BE49-F238E27FC236}">
-                <a16:creationId xmlns:a16="http://schemas.microsoft.com/office/drawing/2014/main" id="{3DC34B26-CEDB-5849-A1BD-D1D084364056}"/>
+          <p:cNvPr id="8" name="Rectangle 7">
+            <a:extLst>
+              <a:ext uri="{FF2B5EF4-FFF2-40B4-BE49-F238E27FC236}">
+                <a16:creationId xmlns:a16="http://schemas.microsoft.com/office/drawing/2014/main" id="{2E17744A-D498-7647-8611-DEF5929758F3}"/>
               </a:ext>
             </a:extLst>
           </p:cNvPr>
@@ -3850,7 +3857,7 @@
         </p:nvSpPr>
         <p:spPr>
           <a:xfrm>
-            <a:off x="3336353" y="703891"/>
+            <a:off x="3336353" y="2118251"/>
             <a:ext cx="1190694" cy="618371"/>
           </a:xfrm>
           <a:prstGeom prst="rect">
@@ -3880,17 +3887,17 @@
             <a:pPr algn="ctr"/>
             <a:r>
               <a:rPr lang="en-US" dirty="0"/>
-              <a:t>Payment Key</a:t>
-            </a:r>
-          </a:p>
-        </p:txBody>
-      </p:sp>
-      <p:sp>
-        <p:nvSpPr>
-          <p:cNvPr id="8" name="Rectangle 7">
-            <a:extLst>
-              <a:ext uri="{FF2B5EF4-FFF2-40B4-BE49-F238E27FC236}">
-                <a16:creationId xmlns:a16="http://schemas.microsoft.com/office/drawing/2014/main" id="{2E17744A-D498-7647-8611-DEF5929758F3}"/>
+              <a:t>Stake Address</a:t>
+            </a:r>
+          </a:p>
+        </p:txBody>
+      </p:sp>
+      <p:sp>
+        <p:nvSpPr>
+          <p:cNvPr id="9" name="Rectangle 8">
+            <a:extLst>
+              <a:ext uri="{FF2B5EF4-FFF2-40B4-BE49-F238E27FC236}">
+                <a16:creationId xmlns:a16="http://schemas.microsoft.com/office/drawing/2014/main" id="{D98F03E9-683C-7C4C-9FFB-4DA467B76C6F}"/>
               </a:ext>
             </a:extLst>
           </p:cNvPr>
@@ -3899,7 +3906,7 @@
         </p:nvSpPr>
         <p:spPr>
           <a:xfrm>
-            <a:off x="3336353" y="1664340"/>
+            <a:off x="3336353" y="3078700"/>
             <a:ext cx="1190694" cy="618371"/>
           </a:xfrm>
           <a:prstGeom prst="rect">
@@ -3929,17 +3936,17 @@
             <a:pPr algn="ctr"/>
             <a:r>
               <a:rPr lang="en-US" dirty="0"/>
-              <a:t>Stake Key</a:t>
-            </a:r>
-          </a:p>
-        </p:txBody>
-      </p:sp>
-      <p:sp>
-        <p:nvSpPr>
-          <p:cNvPr id="9" name="Rectangle 8">
-            <a:extLst>
-              <a:ext uri="{FF2B5EF4-FFF2-40B4-BE49-F238E27FC236}">
-                <a16:creationId xmlns:a16="http://schemas.microsoft.com/office/drawing/2014/main" id="{D98F03E9-683C-7C4C-9FFB-4DA467B76C6F}"/>
+              <a:t>Vote Address</a:t>
+            </a:r>
+          </a:p>
+        </p:txBody>
+      </p:sp>
+      <p:sp>
+        <p:nvSpPr>
+          <p:cNvPr id="10" name="Rectangle 9">
+            <a:extLst>
+              <a:ext uri="{FF2B5EF4-FFF2-40B4-BE49-F238E27FC236}">
+                <a16:creationId xmlns:a16="http://schemas.microsoft.com/office/drawing/2014/main" id="{C3CB45A3-87C9-EC4C-AC63-3D97CBADBA18}"/>
               </a:ext>
             </a:extLst>
           </p:cNvPr>
@@ -3948,7 +3955,7 @@
         </p:nvSpPr>
         <p:spPr>
           <a:xfrm>
-            <a:off x="3336353" y="2624789"/>
+            <a:off x="7080569" y="2118251"/>
             <a:ext cx="1190694" cy="618371"/>
           </a:xfrm>
           <a:prstGeom prst="rect">
@@ -3978,7 +3985,551 @@
             <a:pPr algn="ctr"/>
             <a:r>
               <a:rPr lang="en-US" dirty="0"/>
-              <a:t>Vote Key</a:t>
+              <a:t>Stake Pool</a:t>
+            </a:r>
+          </a:p>
+        </p:txBody>
+      </p:sp>
+      <p:cxnSp>
+        <p:nvCxnSpPr>
+          <p:cNvPr id="6" name="Straight Arrow Connector 5">
+            <a:extLst>
+              <a:ext uri="{FF2B5EF4-FFF2-40B4-BE49-F238E27FC236}">
+                <a16:creationId xmlns:a16="http://schemas.microsoft.com/office/drawing/2014/main" id="{D4C19A5D-E5DC-BB44-BBDE-FDED7F212657}"/>
+              </a:ext>
+            </a:extLst>
+          </p:cNvPr>
+          <p:cNvCxnSpPr/>
+          <p:nvPr/>
+        </p:nvCxnSpPr>
+        <p:spPr>
+          <a:xfrm>
+            <a:off x="4527047" y="2427437"/>
+            <a:ext cx="2553522" cy="0"/>
+          </a:xfrm>
+          <a:prstGeom prst="straightConnector1">
+            <a:avLst/>
+          </a:prstGeom>
+          <a:ln>
+            <a:tailEnd type="triangle"/>
+          </a:ln>
+        </p:spPr>
+        <p:style>
+          <a:lnRef idx="1">
+            <a:schemeClr val="accent1"/>
+          </a:lnRef>
+          <a:fillRef idx="0">
+            <a:schemeClr val="accent1"/>
+          </a:fillRef>
+          <a:effectRef idx="0">
+            <a:schemeClr val="accent1"/>
+          </a:effectRef>
+          <a:fontRef idx="minor">
+            <a:schemeClr val="tx1"/>
+          </a:fontRef>
+        </p:style>
+      </p:cxnSp>
+      <p:sp>
+        <p:nvSpPr>
+          <p:cNvPr id="13" name="Rectangle 12">
+            <a:extLst>
+              <a:ext uri="{FF2B5EF4-FFF2-40B4-BE49-F238E27FC236}">
+                <a16:creationId xmlns:a16="http://schemas.microsoft.com/office/drawing/2014/main" id="{F6FE87DA-707B-224F-9F54-FFB840967469}"/>
+              </a:ext>
+            </a:extLst>
+          </p:cNvPr>
+          <p:cNvSpPr/>
+          <p:nvPr/>
+        </p:nvSpPr>
+        <p:spPr>
+          <a:xfrm>
+            <a:off x="7080569" y="3078700"/>
+            <a:ext cx="1190694" cy="618371"/>
+          </a:xfrm>
+          <a:prstGeom prst="rect">
+            <a:avLst/>
+          </a:prstGeom>
+        </p:spPr>
+        <p:style>
+          <a:lnRef idx="2">
+            <a:schemeClr val="accent1">
+              <a:shade val="50000"/>
+            </a:schemeClr>
+          </a:lnRef>
+          <a:fillRef idx="1">
+            <a:schemeClr val="accent1"/>
+          </a:fillRef>
+          <a:effectRef idx="0">
+            <a:schemeClr val="accent1"/>
+          </a:effectRef>
+          <a:fontRef idx="minor">
+            <a:schemeClr val="lt1"/>
+          </a:fontRef>
+        </p:style>
+        <p:txBody>
+          <a:bodyPr rtlCol="0" anchor="ctr"/>
+          <a:lstStyle/>
+          <a:p>
+            <a:pPr algn="ctr"/>
+            <a:r>
+              <a:rPr lang="en-US" dirty="0"/>
+              <a:t>Delegate</a:t>
+            </a:r>
+          </a:p>
+        </p:txBody>
+      </p:sp>
+      <p:cxnSp>
+        <p:nvCxnSpPr>
+          <p:cNvPr id="14" name="Straight Arrow Connector 13">
+            <a:extLst>
+              <a:ext uri="{FF2B5EF4-FFF2-40B4-BE49-F238E27FC236}">
+                <a16:creationId xmlns:a16="http://schemas.microsoft.com/office/drawing/2014/main" id="{BDCE116A-CA5A-7D47-8BB3-57CF8D79488F}"/>
+              </a:ext>
+            </a:extLst>
+          </p:cNvPr>
+          <p:cNvCxnSpPr/>
+          <p:nvPr/>
+        </p:nvCxnSpPr>
+        <p:spPr>
+          <a:xfrm>
+            <a:off x="4527047" y="3342933"/>
+            <a:ext cx="2553522" cy="0"/>
+          </a:xfrm>
+          <a:prstGeom prst="straightConnector1">
+            <a:avLst/>
+          </a:prstGeom>
+          <a:ln>
+            <a:tailEnd type="triangle"/>
+          </a:ln>
+        </p:spPr>
+        <p:style>
+          <a:lnRef idx="1">
+            <a:schemeClr val="accent1"/>
+          </a:lnRef>
+          <a:fillRef idx="0">
+            <a:schemeClr val="accent1"/>
+          </a:fillRef>
+          <a:effectRef idx="0">
+            <a:schemeClr val="accent1"/>
+          </a:effectRef>
+          <a:fontRef idx="minor">
+            <a:schemeClr val="tx1"/>
+          </a:fontRef>
+        </p:style>
+      </p:cxnSp>
+      <p:sp>
+        <p:nvSpPr>
+          <p:cNvPr id="11" name="TextBox 10">
+            <a:extLst>
+              <a:ext uri="{FF2B5EF4-FFF2-40B4-BE49-F238E27FC236}">
+                <a16:creationId xmlns:a16="http://schemas.microsoft.com/office/drawing/2014/main" id="{EB7FEC2E-3E2E-D542-9800-FD28E9547505}"/>
+              </a:ext>
+            </a:extLst>
+          </p:cNvPr>
+          <p:cNvSpPr txBox="1"/>
+          <p:nvPr/>
+        </p:nvSpPr>
+        <p:spPr>
+          <a:xfrm>
+            <a:off x="5321657" y="2170173"/>
+            <a:ext cx="964303" cy="276999"/>
+          </a:xfrm>
+          <a:prstGeom prst="rect">
+            <a:avLst/>
+          </a:prstGeom>
+          <a:noFill/>
+        </p:spPr>
+        <p:txBody>
+          <a:bodyPr wrap="none" rtlCol="0">
+            <a:spAutoFit/>
+          </a:bodyPr>
+          <a:lstStyle/>
+          <a:p>
+            <a:r>
+              <a:rPr lang="en-US" sz="1200" dirty="0"/>
+              <a:t>Delegates to</a:t>
+            </a:r>
+          </a:p>
+        </p:txBody>
+      </p:sp>
+      <p:sp>
+        <p:nvSpPr>
+          <p:cNvPr id="16" name="TextBox 15">
+            <a:extLst>
+              <a:ext uri="{FF2B5EF4-FFF2-40B4-BE49-F238E27FC236}">
+                <a16:creationId xmlns:a16="http://schemas.microsoft.com/office/drawing/2014/main" id="{24823767-98A0-8C4A-96C3-C6B760CF9F99}"/>
+              </a:ext>
+            </a:extLst>
+          </p:cNvPr>
+          <p:cNvSpPr txBox="1"/>
+          <p:nvPr/>
+        </p:nvSpPr>
+        <p:spPr>
+          <a:xfrm>
+            <a:off x="5321657" y="3077995"/>
+            <a:ext cx="964303" cy="276999"/>
+          </a:xfrm>
+          <a:prstGeom prst="rect">
+            <a:avLst/>
+          </a:prstGeom>
+          <a:noFill/>
+        </p:spPr>
+        <p:txBody>
+          <a:bodyPr wrap="none" rtlCol="0">
+            <a:spAutoFit/>
+          </a:bodyPr>
+          <a:lstStyle/>
+          <a:p>
+            <a:r>
+              <a:rPr lang="en-US" sz="1200" dirty="0"/>
+              <a:t>Delegates to</a:t>
+            </a:r>
+          </a:p>
+        </p:txBody>
+      </p:sp>
+      <p:cxnSp>
+        <p:nvCxnSpPr>
+          <p:cNvPr id="17" name="Straight Arrow Connector 16">
+            <a:extLst>
+              <a:ext uri="{FF2B5EF4-FFF2-40B4-BE49-F238E27FC236}">
+                <a16:creationId xmlns:a16="http://schemas.microsoft.com/office/drawing/2014/main" id="{76B52077-3E48-2242-B979-DA8A839721E0}"/>
+              </a:ext>
+            </a:extLst>
+          </p:cNvPr>
+          <p:cNvCxnSpPr>
+            <a:cxnSpLocks/>
+            <a:stCxn id="4" idx="2"/>
+            <a:endCxn id="8" idx="1"/>
+          </p:cNvCxnSpPr>
+          <p:nvPr/>
+        </p:nvCxnSpPr>
+        <p:spPr>
+          <a:xfrm>
+            <a:off x="1674207" y="1322262"/>
+            <a:ext cx="1662146" cy="1105175"/>
+          </a:xfrm>
+          <a:prstGeom prst="straightConnector1">
+            <a:avLst/>
+          </a:prstGeom>
+          <a:ln>
+            <a:tailEnd type="triangle"/>
+          </a:ln>
+        </p:spPr>
+        <p:style>
+          <a:lnRef idx="1">
+            <a:schemeClr val="accent1"/>
+          </a:lnRef>
+          <a:fillRef idx="0">
+            <a:schemeClr val="accent1"/>
+          </a:fillRef>
+          <a:effectRef idx="0">
+            <a:schemeClr val="accent1"/>
+          </a:effectRef>
+          <a:fontRef idx="minor">
+            <a:schemeClr val="tx1"/>
+          </a:fontRef>
+        </p:style>
+      </p:cxnSp>
+      <p:cxnSp>
+        <p:nvCxnSpPr>
+          <p:cNvPr id="21" name="Straight Arrow Connector 20">
+            <a:extLst>
+              <a:ext uri="{FF2B5EF4-FFF2-40B4-BE49-F238E27FC236}">
+                <a16:creationId xmlns:a16="http://schemas.microsoft.com/office/drawing/2014/main" id="{0E193DD6-5FB5-A348-9578-25B3161B6BE1}"/>
+              </a:ext>
+            </a:extLst>
+          </p:cNvPr>
+          <p:cNvCxnSpPr>
+            <a:cxnSpLocks/>
+            <a:endCxn id="9" idx="1"/>
+          </p:cNvCxnSpPr>
+          <p:nvPr/>
+        </p:nvCxnSpPr>
+        <p:spPr>
+          <a:xfrm>
+            <a:off x="1553341" y="1261217"/>
+            <a:ext cx="1783012" cy="2126669"/>
+          </a:xfrm>
+          <a:prstGeom prst="straightConnector1">
+            <a:avLst/>
+          </a:prstGeom>
+          <a:ln>
+            <a:tailEnd type="triangle"/>
+          </a:ln>
+        </p:spPr>
+        <p:style>
+          <a:lnRef idx="1">
+            <a:schemeClr val="accent1"/>
+          </a:lnRef>
+          <a:fillRef idx="0">
+            <a:schemeClr val="accent1"/>
+          </a:fillRef>
+          <a:effectRef idx="0">
+            <a:schemeClr val="accent1"/>
+          </a:effectRef>
+          <a:fontRef idx="minor">
+            <a:schemeClr val="tx1"/>
+          </a:fontRef>
+        </p:style>
+      </p:cxnSp>
+      <p:sp>
+        <p:nvSpPr>
+          <p:cNvPr id="18" name="TextBox 17">
+            <a:extLst>
+              <a:ext uri="{FF2B5EF4-FFF2-40B4-BE49-F238E27FC236}">
+                <a16:creationId xmlns:a16="http://schemas.microsoft.com/office/drawing/2014/main" id="{CF68580B-0A9B-9743-BD6C-C8BC35A0FEF2}"/>
+              </a:ext>
+            </a:extLst>
+          </p:cNvPr>
+          <p:cNvSpPr txBox="1"/>
+          <p:nvPr/>
+        </p:nvSpPr>
+        <p:spPr>
+          <a:xfrm>
+            <a:off x="1900429" y="1736349"/>
+            <a:ext cx="738250" cy="276999"/>
+          </a:xfrm>
+          <a:prstGeom prst="rect">
+            <a:avLst/>
+          </a:prstGeom>
+          <a:solidFill>
+            <a:schemeClr val="bg1"/>
+          </a:solidFill>
+        </p:spPr>
+        <p:txBody>
+          <a:bodyPr wrap="square" rtlCol="0">
+            <a:spAutoFit/>
+          </a:bodyPr>
+          <a:lstStyle/>
+          <a:p>
+            <a:r>
+              <a:rPr lang="en-US" sz="1200" dirty="0"/>
+              <a:t>Refers to</a:t>
+            </a:r>
+          </a:p>
+        </p:txBody>
+      </p:sp>
+      <p:sp>
+        <p:nvSpPr>
+          <p:cNvPr id="24" name="TextBox 23">
+            <a:extLst>
+              <a:ext uri="{FF2B5EF4-FFF2-40B4-BE49-F238E27FC236}">
+                <a16:creationId xmlns:a16="http://schemas.microsoft.com/office/drawing/2014/main" id="{A1DB8AE6-7DA1-A141-AB48-A32846CEEC20}"/>
+              </a:ext>
+            </a:extLst>
+          </p:cNvPr>
+          <p:cNvSpPr txBox="1"/>
+          <p:nvPr/>
+        </p:nvSpPr>
+        <p:spPr>
+          <a:xfrm>
+            <a:off x="3457219" y="1551683"/>
+            <a:ext cx="880311" cy="461665"/>
+          </a:xfrm>
+          <a:prstGeom prst="rect">
+            <a:avLst/>
+          </a:prstGeom>
+          <a:solidFill>
+            <a:schemeClr val="bg1"/>
+          </a:solidFill>
+        </p:spPr>
+        <p:txBody>
+          <a:bodyPr wrap="square" rtlCol="0">
+            <a:spAutoFit/>
+          </a:bodyPr>
+          <a:lstStyle/>
+          <a:p>
+            <a:r>
+              <a:rPr lang="en-US" sz="1200" dirty="0"/>
+              <a:t>Registered On-Chain</a:t>
+            </a:r>
+          </a:p>
+        </p:txBody>
+      </p:sp>
+      <p:cxnSp>
+        <p:nvCxnSpPr>
+          <p:cNvPr id="25" name="Straight Arrow Connector 24">
+            <a:extLst>
+              <a:ext uri="{FF2B5EF4-FFF2-40B4-BE49-F238E27FC236}">
+                <a16:creationId xmlns:a16="http://schemas.microsoft.com/office/drawing/2014/main" id="{6392B5FC-B035-C246-8960-7B3B18803F20}"/>
+              </a:ext>
+            </a:extLst>
+          </p:cNvPr>
+          <p:cNvCxnSpPr>
+            <a:cxnSpLocks/>
+            <a:endCxn id="28" idx="1"/>
+          </p:cNvCxnSpPr>
+          <p:nvPr/>
+        </p:nvCxnSpPr>
+        <p:spPr>
+          <a:xfrm>
+            <a:off x="2269554" y="1012724"/>
+            <a:ext cx="4811015" cy="353"/>
+          </a:xfrm>
+          <a:prstGeom prst="straightConnector1">
+            <a:avLst/>
+          </a:prstGeom>
+          <a:ln>
+            <a:tailEnd type="triangle"/>
+          </a:ln>
+        </p:spPr>
+        <p:style>
+          <a:lnRef idx="1">
+            <a:schemeClr val="accent1"/>
+          </a:lnRef>
+          <a:fillRef idx="0">
+            <a:schemeClr val="accent1"/>
+          </a:fillRef>
+          <a:effectRef idx="0">
+            <a:schemeClr val="accent1"/>
+          </a:effectRef>
+          <a:fontRef idx="minor">
+            <a:schemeClr val="tx1"/>
+          </a:fontRef>
+        </p:style>
+      </p:cxnSp>
+      <p:sp>
+        <p:nvSpPr>
+          <p:cNvPr id="26" name="TextBox 25">
+            <a:extLst>
+              <a:ext uri="{FF2B5EF4-FFF2-40B4-BE49-F238E27FC236}">
+                <a16:creationId xmlns:a16="http://schemas.microsoft.com/office/drawing/2014/main" id="{ABC46814-9E2E-874F-A41E-3668385579BA}"/>
+              </a:ext>
+            </a:extLst>
+          </p:cNvPr>
+          <p:cNvSpPr txBox="1"/>
+          <p:nvPr/>
+        </p:nvSpPr>
+        <p:spPr>
+          <a:xfrm>
+            <a:off x="4105533" y="703186"/>
+            <a:ext cx="633507" cy="276999"/>
+          </a:xfrm>
+          <a:prstGeom prst="rect">
+            <a:avLst/>
+          </a:prstGeom>
+          <a:noFill/>
+        </p:spPr>
+        <p:txBody>
+          <a:bodyPr wrap="none" rtlCol="0">
+            <a:spAutoFit/>
+          </a:bodyPr>
+          <a:lstStyle/>
+          <a:p>
+            <a:r>
+              <a:rPr lang="en-US" sz="1200" dirty="0"/>
+              <a:t>Spends</a:t>
+            </a:r>
+          </a:p>
+        </p:txBody>
+      </p:sp>
+      <p:sp>
+        <p:nvSpPr>
+          <p:cNvPr id="28" name="Rectangle 27">
+            <a:extLst>
+              <a:ext uri="{FF2B5EF4-FFF2-40B4-BE49-F238E27FC236}">
+                <a16:creationId xmlns:a16="http://schemas.microsoft.com/office/drawing/2014/main" id="{924B8007-D185-B84E-9A05-6E52BA60E7C9}"/>
+              </a:ext>
+            </a:extLst>
+          </p:cNvPr>
+          <p:cNvSpPr/>
+          <p:nvPr/>
+        </p:nvSpPr>
+        <p:spPr>
+          <a:xfrm>
+            <a:off x="7080569" y="703891"/>
+            <a:ext cx="1190694" cy="618371"/>
+          </a:xfrm>
+          <a:prstGeom prst="rect">
+            <a:avLst/>
+          </a:prstGeom>
+          <a:solidFill>
+            <a:schemeClr val="bg1"/>
+          </a:solidFill>
+          <a:ln>
+            <a:prstDash val="dash"/>
+          </a:ln>
+        </p:spPr>
+        <p:style>
+          <a:lnRef idx="2">
+            <a:schemeClr val="accent1">
+              <a:shade val="50000"/>
+            </a:schemeClr>
+          </a:lnRef>
+          <a:fillRef idx="1">
+            <a:schemeClr val="accent1"/>
+          </a:fillRef>
+          <a:effectRef idx="0">
+            <a:schemeClr val="accent1"/>
+          </a:effectRef>
+          <a:fontRef idx="minor">
+            <a:schemeClr val="lt1"/>
+          </a:fontRef>
+        </p:style>
+        <p:txBody>
+          <a:bodyPr rtlCol="0" anchor="ctr"/>
+          <a:lstStyle/>
+          <a:p>
+            <a:pPr algn="ctr"/>
+            <a:r>
+              <a:rPr lang="en-US" dirty="0">
+                <a:solidFill>
+                  <a:schemeClr val="tx1"/>
+                </a:solidFill>
+              </a:rPr>
+              <a:t>Ada</a:t>
+            </a:r>
+            <a:br>
+              <a:rPr lang="en-US" dirty="0">
+                <a:solidFill>
+                  <a:schemeClr val="tx1"/>
+                </a:solidFill>
+              </a:rPr>
+            </a:br>
+            <a:r>
+              <a:rPr lang="en-US" dirty="0">
+                <a:solidFill>
+                  <a:schemeClr val="tx1"/>
+                </a:solidFill>
+              </a:rPr>
+              <a:t>Holder</a:t>
+            </a:r>
+          </a:p>
+        </p:txBody>
+      </p:sp>
+      <p:sp>
+        <p:nvSpPr>
+          <p:cNvPr id="32" name="TextBox 31">
+            <a:extLst>
+              <a:ext uri="{FF2B5EF4-FFF2-40B4-BE49-F238E27FC236}">
+                <a16:creationId xmlns:a16="http://schemas.microsoft.com/office/drawing/2014/main" id="{32FAED69-D580-3C44-8677-AC6BB82B491B}"/>
+              </a:ext>
+            </a:extLst>
+          </p:cNvPr>
+          <p:cNvSpPr txBox="1"/>
+          <p:nvPr/>
+        </p:nvSpPr>
+        <p:spPr>
+          <a:xfrm>
+            <a:off x="3457219" y="3775189"/>
+            <a:ext cx="880311" cy="461665"/>
+          </a:xfrm>
+          <a:prstGeom prst="rect">
+            <a:avLst/>
+          </a:prstGeom>
+          <a:solidFill>
+            <a:schemeClr val="bg1"/>
+          </a:solidFill>
+        </p:spPr>
+        <p:txBody>
+          <a:bodyPr wrap="square" rtlCol="0">
+            <a:spAutoFit/>
+          </a:bodyPr>
+          <a:lstStyle/>
+          <a:p>
+            <a:r>
+              <a:rPr lang="en-US" sz="1200" dirty="0"/>
+              <a:t>Registered On-Chain</a:t>
             </a:r>
           </a:p>
         </p:txBody>

</xml_diff>